<commit_message>
Faltou adicionar os slides
</commit_message>
<xml_diff>
--- a/slides/lesson2/wtf-is-an-arduino-lesson2.pptx
+++ b/slides/lesson2/wtf-is-an-arduino-lesson2.pptx
@@ -10565,16 +10565,16 @@
               <a:t>	</a:t>
             </a:r>
             <a:r>
-              <a:rPr lang="pt-BR" smtClean="0">
-                <a:latin typeface="DINCond-Regular" pitchFamily="50" charset="0"/>
-              </a:rPr>
-              <a:t>outputPin </a:t>
+              <a:rPr lang="pt-BR" dirty="0" err="1" smtClean="0">
+                <a:latin typeface="DINCond-Regular" pitchFamily="50" charset="0"/>
+              </a:rPr>
+              <a:t>outputPin</a:t>
             </a:r>
             <a:r>
               <a:rPr lang="pt-BR" dirty="0" smtClean="0">
                 <a:latin typeface="DINCond-Regular" pitchFamily="50" charset="0"/>
               </a:rPr>
-              <a:t>= 13;</a:t>
+              <a:t> = 13;</a:t>
             </a:r>
           </a:p>
           <a:p>

</xml_diff>